<commit_message>
Narrow list of example technologies
Currently the TAC does not take a position on whether a specific technology
is or is not confidential computing.  Similarly it does not claim to
have a complete list.

We are already on thin ice by calling out some technologies as
"claiming support" since some may still interpret this as endorsement of
said claims, so it would seem best to be very conservative about including
things if we continue to include them, and only refer to them as
examples.

There is apparently some debate around the strength of some technologies
(e.g., SEV as opposed to SEV-SNP), so this proposal is to only mention things
that are not debated so as to not take any position in the debate, while
adding the word "Examples" in the diagrams to make it clear it is not
intended to be a complete list.

Signed-off-by: Dave Thaler <dthaler@microsoft.com>
</commit_message>
<xml_diff>
--- a/terminology/Image-Source.pptx
+++ b/terminology/Image-Source.pptx
@@ -206,7 +206,7 @@
           <a:p>
             <a:fld id="{BEB2A2CE-FF9D-4999-808F-9409E590A58C}" type="datetimeFigureOut">
               <a:rPr lang="en-US" smtClean="0"/>
-              <a:t>8/26/2022</a:t>
+              <a:t>9/20/2022</a:t>
             </a:fld>
             <a:endParaRPr lang="en-US"/>
           </a:p>
@@ -620,7 +620,7 @@
           <a:p>
             <a:fld id="{7711E8AF-76FE-406B-93C1-ACC48771439D}" type="datetimeFigureOut">
               <a:rPr lang="en-US" smtClean="0"/>
-              <a:t>8/26/2022</a:t>
+              <a:t>9/20/2022</a:t>
             </a:fld>
             <a:endParaRPr lang="en-US"/>
           </a:p>
@@ -818,7 +818,7 @@
           <a:p>
             <a:fld id="{7711E8AF-76FE-406B-93C1-ACC48771439D}" type="datetimeFigureOut">
               <a:rPr lang="en-US" smtClean="0"/>
-              <a:t>8/26/2022</a:t>
+              <a:t>9/20/2022</a:t>
             </a:fld>
             <a:endParaRPr lang="en-US"/>
           </a:p>
@@ -1026,7 +1026,7 @@
           <a:p>
             <a:fld id="{7711E8AF-76FE-406B-93C1-ACC48771439D}" type="datetimeFigureOut">
               <a:rPr lang="en-US" smtClean="0"/>
-              <a:t>8/26/2022</a:t>
+              <a:t>9/20/2022</a:t>
             </a:fld>
             <a:endParaRPr lang="en-US"/>
           </a:p>
@@ -1224,7 +1224,7 @@
           <a:p>
             <a:fld id="{7711E8AF-76FE-406B-93C1-ACC48771439D}" type="datetimeFigureOut">
               <a:rPr lang="en-US" smtClean="0"/>
-              <a:t>8/26/2022</a:t>
+              <a:t>9/20/2022</a:t>
             </a:fld>
             <a:endParaRPr lang="en-US"/>
           </a:p>
@@ -1499,7 +1499,7 @@
           <a:p>
             <a:fld id="{7711E8AF-76FE-406B-93C1-ACC48771439D}" type="datetimeFigureOut">
               <a:rPr lang="en-US" smtClean="0"/>
-              <a:t>8/26/2022</a:t>
+              <a:t>9/20/2022</a:t>
             </a:fld>
             <a:endParaRPr lang="en-US"/>
           </a:p>
@@ -1764,7 +1764,7 @@
           <a:p>
             <a:fld id="{7711E8AF-76FE-406B-93C1-ACC48771439D}" type="datetimeFigureOut">
               <a:rPr lang="en-US" smtClean="0"/>
-              <a:t>8/26/2022</a:t>
+              <a:t>9/20/2022</a:t>
             </a:fld>
             <a:endParaRPr lang="en-US"/>
           </a:p>
@@ -2176,7 +2176,7 @@
           <a:p>
             <a:fld id="{7711E8AF-76FE-406B-93C1-ACC48771439D}" type="datetimeFigureOut">
               <a:rPr lang="en-US" smtClean="0"/>
-              <a:t>8/26/2022</a:t>
+              <a:t>9/20/2022</a:t>
             </a:fld>
             <a:endParaRPr lang="en-US"/>
           </a:p>
@@ -2317,7 +2317,7 @@
           <a:p>
             <a:fld id="{7711E8AF-76FE-406B-93C1-ACC48771439D}" type="datetimeFigureOut">
               <a:rPr lang="en-US" smtClean="0"/>
-              <a:t>8/26/2022</a:t>
+              <a:t>9/20/2022</a:t>
             </a:fld>
             <a:endParaRPr lang="en-US"/>
           </a:p>
@@ -2430,7 +2430,7 @@
           <a:p>
             <a:fld id="{7711E8AF-76FE-406B-93C1-ACC48771439D}" type="datetimeFigureOut">
               <a:rPr lang="en-US" smtClean="0"/>
-              <a:t>8/26/2022</a:t>
+              <a:t>9/20/2022</a:t>
             </a:fld>
             <a:endParaRPr lang="en-US"/>
           </a:p>
@@ -2741,7 +2741,7 @@
           <a:p>
             <a:fld id="{7711E8AF-76FE-406B-93C1-ACC48771439D}" type="datetimeFigureOut">
               <a:rPr lang="en-US" smtClean="0"/>
-              <a:t>8/26/2022</a:t>
+              <a:t>9/20/2022</a:t>
             </a:fld>
             <a:endParaRPr lang="en-US"/>
           </a:p>
@@ -3029,7 +3029,7 @@
           <a:p>
             <a:fld id="{7711E8AF-76FE-406B-93C1-ACC48771439D}" type="datetimeFigureOut">
               <a:rPr lang="en-US" smtClean="0"/>
-              <a:t>8/26/2022</a:t>
+              <a:t>9/20/2022</a:t>
             </a:fld>
             <a:endParaRPr lang="en-US"/>
           </a:p>
@@ -3270,7 +3270,7 @@
           <a:p>
             <a:fld id="{7711E8AF-76FE-406B-93C1-ACC48771439D}" type="datetimeFigureOut">
               <a:rPr lang="en-US" smtClean="0"/>
-              <a:t>8/26/2022</a:t>
+              <a:t>9/20/2022</a:t>
             </a:fld>
             <a:endParaRPr lang="en-US"/>
           </a:p>
@@ -5310,7 +5310,7 @@
         <p:spPr>
           <a:xfrm>
             <a:off x="354185" y="4945192"/>
-            <a:ext cx="1131514" cy="646331"/>
+            <a:ext cx="1131514" cy="830997"/>
           </a:xfrm>
           <a:prstGeom prst="rect">
             <a:avLst/>
@@ -5343,7 +5343,7 @@
                   <a:schemeClr val="lt1"/>
                 </a:solidFill>
               </a:rPr>
-              <a:t>Technologies</a:t>
+              <a:t>Example Technologies</a:t>
             </a:r>
           </a:p>
           <a:p>
@@ -9752,7 +9752,7 @@
                     <a:schemeClr val="dk1"/>
                   </a:solidFill>
                 </a:rPr>
-                <a:t>CCA, SEV, SEV-SNP, TDX </a:t>
+                <a:t>CCA, SEV-SNP, TDX </a:t>
               </a:r>
             </a:p>
           </p:txBody>
@@ -9809,7 +9809,7 @@
                     <a:schemeClr val="dk1"/>
                   </a:solidFill>
                 </a:rPr>
-                <a:t>CCA, SEV, SEV-SNP, TDX </a:t>
+                <a:t>CCA, SEV-SNP, TDX </a:t>
               </a:r>
             </a:p>
           </p:txBody>
@@ -13834,7 +13834,7 @@
         </p:nvSpPr>
         <p:spPr>
           <a:xfrm>
-            <a:off x="9753600" y="2171700"/>
+            <a:off x="9757410" y="2475562"/>
             <a:ext cx="2228850" cy="420038"/>
           </a:xfrm>
           <a:prstGeom prst="rect">
@@ -14070,7 +14070,7 @@
         </p:nvSpPr>
         <p:spPr>
           <a:xfrm>
-            <a:off x="9753600" y="2738672"/>
+            <a:off x="9757410" y="3042534"/>
             <a:ext cx="2228850" cy="420038"/>
           </a:xfrm>
           <a:prstGeom prst="rect">
@@ -14293,7 +14293,7 @@
         </p:nvSpPr>
         <p:spPr>
           <a:xfrm>
-            <a:off x="9753600" y="3305644"/>
+            <a:off x="9757410" y="3609506"/>
             <a:ext cx="2228850" cy="420038"/>
           </a:xfrm>
           <a:prstGeom prst="rect">
@@ -14516,7 +14516,7 @@
         </p:nvSpPr>
         <p:spPr>
           <a:xfrm>
-            <a:off x="9753600" y="3872616"/>
+            <a:off x="9757410" y="4176478"/>
             <a:ext cx="2228850" cy="420038"/>
           </a:xfrm>
           <a:prstGeom prst="rect">
@@ -14725,10 +14725,10 @@
       </p:sp>
       <p:sp>
         <p:nvSpPr>
-          <p:cNvPr id="97" name="Content Placeholder 2">
+          <p:cNvPr id="99" name="Content Placeholder 2">
             <a:extLst>
               <a:ext uri="{FF2B5EF4-FFF2-40B4-BE49-F238E27FC236}">
-                <a16:creationId xmlns:a16="http://schemas.microsoft.com/office/drawing/2014/main" id="{7B22FD81-26F1-2089-3D4E-A559E721B842}"/>
+                <a16:creationId xmlns:a16="http://schemas.microsoft.com/office/drawing/2014/main" id="{5768C30A-79FA-3622-B30B-751C1819B507}"/>
               </a:ext>
             </a:extLst>
           </p:cNvPr>
@@ -14739,7 +14739,7 @@
         </p:nvSpPr>
         <p:spPr>
           <a:xfrm>
-            <a:off x="9753600" y="4439588"/>
+            <a:off x="9753600" y="4743450"/>
             <a:ext cx="2228850" cy="420038"/>
           </a:xfrm>
           <a:prstGeom prst="rect">
@@ -14941,229 +14941,6 @@
                   <a:srgbClr val="0070C0"/>
                 </a:solidFill>
               </a:rPr>
-              <a:t>AMD SEV</a:t>
-            </a:r>
-          </a:p>
-        </p:txBody>
-      </p:sp>
-      <p:sp>
-        <p:nvSpPr>
-          <p:cNvPr id="99" name="Content Placeholder 2">
-            <a:extLst>
-              <a:ext uri="{FF2B5EF4-FFF2-40B4-BE49-F238E27FC236}">
-                <a16:creationId xmlns:a16="http://schemas.microsoft.com/office/drawing/2014/main" id="{5768C30A-79FA-3622-B30B-751C1819B507}"/>
-              </a:ext>
-            </a:extLst>
-          </p:cNvPr>
-          <p:cNvSpPr txBox="1">
-            <a:spLocks/>
-          </p:cNvSpPr>
-          <p:nvPr/>
-        </p:nvSpPr>
-        <p:spPr>
-          <a:xfrm>
-            <a:off x="9753600" y="5006558"/>
-            <a:ext cx="2228850" cy="420038"/>
-          </a:xfrm>
-          <a:prstGeom prst="rect">
-            <a:avLst/>
-          </a:prstGeom>
-        </p:spPr>
-        <p:style>
-          <a:lnRef idx="2">
-            <a:schemeClr val="accent3">
-              <a:shade val="50000"/>
-            </a:schemeClr>
-          </a:lnRef>
-          <a:fillRef idx="1">
-            <a:schemeClr val="accent3"/>
-          </a:fillRef>
-          <a:effectRef idx="0">
-            <a:schemeClr val="accent3"/>
-          </a:effectRef>
-          <a:fontRef idx="minor">
-            <a:schemeClr val="lt1"/>
-          </a:fontRef>
-        </p:style>
-        <p:txBody>
-          <a:bodyPr vert="horz" lIns="91440" tIns="45720" rIns="91440" bIns="45720" rtlCol="0">
-            <a:normAutofit fontScale="92500" lnSpcReduction="10000"/>
-          </a:bodyPr>
-          <a:lstStyle>
-            <a:lvl1pPr marL="228600" indent="-228600" algn="l" defTabSz="914400" rtl="0" eaLnBrk="1" latinLnBrk="0" hangingPunct="1">
-              <a:lnSpc>
-                <a:spcPct val="90000"/>
-              </a:lnSpc>
-              <a:spcBef>
-                <a:spcPts val="1000"/>
-              </a:spcBef>
-              <a:buFont typeface="Arial" panose="020B0604020202020204" pitchFamily="34" charset="0"/>
-              <a:buChar char="•"/>
-              <a:defRPr sz="2800" kern="1200">
-                <a:solidFill>
-                  <a:schemeClr val="lt1"/>
-                </a:solidFill>
-                <a:latin typeface="+mn-lt"/>
-                <a:ea typeface="+mn-ea"/>
-                <a:cs typeface="+mn-cs"/>
-              </a:defRPr>
-            </a:lvl1pPr>
-            <a:lvl2pPr marL="685800" indent="-228600" algn="l" defTabSz="914400" rtl="0" eaLnBrk="1" latinLnBrk="0" hangingPunct="1">
-              <a:lnSpc>
-                <a:spcPct val="90000"/>
-              </a:lnSpc>
-              <a:spcBef>
-                <a:spcPts val="500"/>
-              </a:spcBef>
-              <a:buFont typeface="Arial" panose="020B0604020202020204" pitchFamily="34" charset="0"/>
-              <a:buChar char="•"/>
-              <a:defRPr sz="2400" kern="1200">
-                <a:solidFill>
-                  <a:schemeClr val="lt1"/>
-                </a:solidFill>
-                <a:latin typeface="+mn-lt"/>
-                <a:ea typeface="+mn-ea"/>
-                <a:cs typeface="+mn-cs"/>
-              </a:defRPr>
-            </a:lvl2pPr>
-            <a:lvl3pPr marL="1143000" indent="-228600" algn="l" defTabSz="914400" rtl="0" eaLnBrk="1" latinLnBrk="0" hangingPunct="1">
-              <a:lnSpc>
-                <a:spcPct val="90000"/>
-              </a:lnSpc>
-              <a:spcBef>
-                <a:spcPts val="500"/>
-              </a:spcBef>
-              <a:buFont typeface="Arial" panose="020B0604020202020204" pitchFamily="34" charset="0"/>
-              <a:buChar char="•"/>
-              <a:defRPr sz="2000" kern="1200">
-                <a:solidFill>
-                  <a:schemeClr val="lt1"/>
-                </a:solidFill>
-                <a:latin typeface="+mn-lt"/>
-                <a:ea typeface="+mn-ea"/>
-                <a:cs typeface="+mn-cs"/>
-              </a:defRPr>
-            </a:lvl3pPr>
-            <a:lvl4pPr marL="1600200" indent="-228600" algn="l" defTabSz="914400" rtl="0" eaLnBrk="1" latinLnBrk="0" hangingPunct="1">
-              <a:lnSpc>
-                <a:spcPct val="90000"/>
-              </a:lnSpc>
-              <a:spcBef>
-                <a:spcPts val="500"/>
-              </a:spcBef>
-              <a:buFont typeface="Arial" panose="020B0604020202020204" pitchFamily="34" charset="0"/>
-              <a:buChar char="•"/>
-              <a:defRPr sz="1800" kern="1200">
-                <a:solidFill>
-                  <a:schemeClr val="lt1"/>
-                </a:solidFill>
-                <a:latin typeface="+mn-lt"/>
-                <a:ea typeface="+mn-ea"/>
-                <a:cs typeface="+mn-cs"/>
-              </a:defRPr>
-            </a:lvl4pPr>
-            <a:lvl5pPr marL="2057400" indent="-228600" algn="l" defTabSz="914400" rtl="0" eaLnBrk="1" latinLnBrk="0" hangingPunct="1">
-              <a:lnSpc>
-                <a:spcPct val="90000"/>
-              </a:lnSpc>
-              <a:spcBef>
-                <a:spcPts val="500"/>
-              </a:spcBef>
-              <a:buFont typeface="Arial" panose="020B0604020202020204" pitchFamily="34" charset="0"/>
-              <a:buChar char="•"/>
-              <a:defRPr sz="1800" kern="1200">
-                <a:solidFill>
-                  <a:schemeClr val="lt1"/>
-                </a:solidFill>
-                <a:latin typeface="+mn-lt"/>
-                <a:ea typeface="+mn-ea"/>
-                <a:cs typeface="+mn-cs"/>
-              </a:defRPr>
-            </a:lvl5pPr>
-            <a:lvl6pPr marL="2514600" indent="-228600" algn="l" defTabSz="914400" rtl="0" eaLnBrk="1" latinLnBrk="0" hangingPunct="1">
-              <a:lnSpc>
-                <a:spcPct val="90000"/>
-              </a:lnSpc>
-              <a:spcBef>
-                <a:spcPts val="500"/>
-              </a:spcBef>
-              <a:buFont typeface="Arial" panose="020B0604020202020204" pitchFamily="34" charset="0"/>
-              <a:buChar char="•"/>
-              <a:defRPr sz="1800" kern="1200">
-                <a:solidFill>
-                  <a:schemeClr val="lt1"/>
-                </a:solidFill>
-                <a:latin typeface="+mn-lt"/>
-                <a:ea typeface="+mn-ea"/>
-                <a:cs typeface="+mn-cs"/>
-              </a:defRPr>
-            </a:lvl6pPr>
-            <a:lvl7pPr marL="2971800" indent="-228600" algn="l" defTabSz="914400" rtl="0" eaLnBrk="1" latinLnBrk="0" hangingPunct="1">
-              <a:lnSpc>
-                <a:spcPct val="90000"/>
-              </a:lnSpc>
-              <a:spcBef>
-                <a:spcPts val="500"/>
-              </a:spcBef>
-              <a:buFont typeface="Arial" panose="020B0604020202020204" pitchFamily="34" charset="0"/>
-              <a:buChar char="•"/>
-              <a:defRPr sz="1800" kern="1200">
-                <a:solidFill>
-                  <a:schemeClr val="lt1"/>
-                </a:solidFill>
-                <a:latin typeface="+mn-lt"/>
-                <a:ea typeface="+mn-ea"/>
-                <a:cs typeface="+mn-cs"/>
-              </a:defRPr>
-            </a:lvl7pPr>
-            <a:lvl8pPr marL="3429000" indent="-228600" algn="l" defTabSz="914400" rtl="0" eaLnBrk="1" latinLnBrk="0" hangingPunct="1">
-              <a:lnSpc>
-                <a:spcPct val="90000"/>
-              </a:lnSpc>
-              <a:spcBef>
-                <a:spcPts val="500"/>
-              </a:spcBef>
-              <a:buFont typeface="Arial" panose="020B0604020202020204" pitchFamily="34" charset="0"/>
-              <a:buChar char="•"/>
-              <a:defRPr sz="1800" kern="1200">
-                <a:solidFill>
-                  <a:schemeClr val="lt1"/>
-                </a:solidFill>
-                <a:latin typeface="+mn-lt"/>
-                <a:ea typeface="+mn-ea"/>
-                <a:cs typeface="+mn-cs"/>
-              </a:defRPr>
-            </a:lvl8pPr>
-            <a:lvl9pPr marL="3886200" indent="-228600" algn="l" defTabSz="914400" rtl="0" eaLnBrk="1" latinLnBrk="0" hangingPunct="1">
-              <a:lnSpc>
-                <a:spcPct val="90000"/>
-              </a:lnSpc>
-              <a:spcBef>
-                <a:spcPts val="500"/>
-              </a:spcBef>
-              <a:buFont typeface="Arial" panose="020B0604020202020204" pitchFamily="34" charset="0"/>
-              <a:buChar char="•"/>
-              <a:defRPr sz="1800" kern="1200">
-                <a:solidFill>
-                  <a:schemeClr val="lt1"/>
-                </a:solidFill>
-                <a:latin typeface="+mn-lt"/>
-                <a:ea typeface="+mn-ea"/>
-                <a:cs typeface="+mn-cs"/>
-              </a:defRPr>
-            </a:lvl9pPr>
-          </a:lstStyle>
-          <a:p>
-            <a:pPr marL="0" indent="0" algn="ctr">
-              <a:buFont typeface="Arial" panose="020B0604020202020204" pitchFamily="34" charset="0"/>
-              <a:buNone/>
-            </a:pPr>
-            <a:r>
-              <a:rPr lang="en-US" dirty="0">
-                <a:solidFill>
-                  <a:srgbClr val="0070C0"/>
-                </a:solidFill>
-              </a:rPr>
               <a:t>AMD SEV-SNP</a:t>
             </a:r>
           </a:p>
@@ -15187,8 +14964,8 @@
         </p:nvCxnSpPr>
         <p:spPr>
           <a:xfrm flipV="1">
-            <a:off x="7753350" y="2381719"/>
-            <a:ext cx="2000250" cy="380062"/>
+            <a:off x="7753350" y="2685581"/>
+            <a:ext cx="2004060" cy="76200"/>
           </a:xfrm>
           <a:prstGeom prst="straightConnector1">
             <a:avLst/>
@@ -15236,7 +15013,7 @@
         <p:spPr>
           <a:xfrm>
             <a:off x="7753350" y="2761781"/>
-            <a:ext cx="2000250" cy="186910"/>
+            <a:ext cx="2004060" cy="490772"/>
           </a:xfrm>
           <a:prstGeom prst="straightConnector1">
             <a:avLst/>
@@ -15284,7 +15061,7 @@
         <p:spPr>
           <a:xfrm>
             <a:off x="7753350" y="2761781"/>
-            <a:ext cx="2000250" cy="753882"/>
+            <a:ext cx="2004060" cy="1057744"/>
           </a:xfrm>
           <a:prstGeom prst="straightConnector1">
             <a:avLst/>
@@ -15332,7 +15109,7 @@
         <p:spPr>
           <a:xfrm>
             <a:off x="7710055" y="3467569"/>
-            <a:ext cx="2043545" cy="615066"/>
+            <a:ext cx="2047355" cy="918928"/>
           </a:xfrm>
           <a:prstGeom prst="straightConnector1">
             <a:avLst/>
@@ -15378,57 +15155,9 @@
           <p:nvPr/>
         </p:nvCxnSpPr>
         <p:spPr>
-          <a:xfrm flipV="1">
-            <a:off x="7710055" y="4082635"/>
-            <a:ext cx="2043545" cy="93295"/>
-          </a:xfrm>
-          <a:prstGeom prst="straightConnector1">
-            <a:avLst/>
-          </a:prstGeom>
-          <a:ln w="41275">
-            <a:solidFill>
-              <a:schemeClr val="bg1">
-                <a:lumMod val="50000"/>
-              </a:schemeClr>
-            </a:solidFill>
-            <a:tailEnd type="triangle"/>
-          </a:ln>
-        </p:spPr>
-        <p:style>
-          <a:lnRef idx="1">
-            <a:schemeClr val="accent1"/>
-          </a:lnRef>
-          <a:fillRef idx="0">
-            <a:schemeClr val="accent1"/>
-          </a:fillRef>
-          <a:effectRef idx="0">
-            <a:schemeClr val="accent1"/>
-          </a:effectRef>
-          <a:fontRef idx="minor">
-            <a:schemeClr val="tx1"/>
-          </a:fontRef>
-        </p:style>
-      </p:cxnSp>
-      <p:cxnSp>
-        <p:nvCxnSpPr>
-          <p:cNvPr id="122" name="Straight Arrow Connector 121">
-            <a:extLst>
-              <a:ext uri="{FF2B5EF4-FFF2-40B4-BE49-F238E27FC236}">
-                <a16:creationId xmlns:a16="http://schemas.microsoft.com/office/drawing/2014/main" id="{52FC6792-02CD-755D-B883-6F8597C8B33C}"/>
-              </a:ext>
-            </a:extLst>
-          </p:cNvPr>
-          <p:cNvCxnSpPr>
-            <a:cxnSpLocks/>
-            <a:stCxn id="8" idx="3"/>
-            <a:endCxn id="97" idx="1"/>
-          </p:cNvCxnSpPr>
-          <p:nvPr/>
-        </p:nvCxnSpPr>
-        <p:spPr>
           <a:xfrm>
             <a:off x="7710055" y="4175930"/>
-            <a:ext cx="2043545" cy="473677"/>
+            <a:ext cx="2047355" cy="210567"/>
           </a:xfrm>
           <a:prstGeom prst="straightConnector1">
             <a:avLst/>
@@ -15476,7 +15205,7 @@
         <p:spPr>
           <a:xfrm>
             <a:off x="7710055" y="4175930"/>
-            <a:ext cx="2043545" cy="1040647"/>
+            <a:ext cx="2043545" cy="777539"/>
           </a:xfrm>
           <a:prstGeom prst="straightConnector1">
             <a:avLst/>
@@ -15523,8 +15252,8 @@
         </p:nvCxnSpPr>
         <p:spPr>
           <a:xfrm flipV="1">
-            <a:off x="7696200" y="2948691"/>
-            <a:ext cx="2057400" cy="1913039"/>
+            <a:off x="7696200" y="3252553"/>
+            <a:ext cx="2061210" cy="1609177"/>
           </a:xfrm>
           <a:prstGeom prst="straightConnector1">
             <a:avLst/>
@@ -15572,8 +15301,8 @@
         </p:nvCxnSpPr>
         <p:spPr>
           <a:xfrm flipV="1">
-            <a:off x="7696200" y="3515663"/>
-            <a:ext cx="2057400" cy="1346067"/>
+            <a:off x="7696200" y="3819525"/>
+            <a:ext cx="2061210" cy="1042205"/>
           </a:xfrm>
           <a:prstGeom prst="straightConnector1">
             <a:avLst/>
@@ -15621,8 +15350,8 @@
         </p:nvCxnSpPr>
         <p:spPr>
           <a:xfrm flipV="1">
-            <a:off x="7696200" y="4082635"/>
-            <a:ext cx="2057400" cy="779095"/>
+            <a:off x="7696200" y="4386497"/>
+            <a:ext cx="2061210" cy="475233"/>
           </a:xfrm>
           <a:prstGeom prst="straightConnector1">
             <a:avLst/>
@@ -15671,7 +15400,7 @@
         <p:spPr>
           <a:xfrm>
             <a:off x="7696200" y="4861730"/>
-            <a:ext cx="2057400" cy="354847"/>
+            <a:ext cx="2057400" cy="91739"/>
           </a:xfrm>
           <a:prstGeom prst="straightConnector1">
             <a:avLst/>
@@ -15740,7 +15469,7 @@
         </p:style>
         <p:txBody>
           <a:bodyPr vert="horz" lIns="91440" tIns="45720" rIns="91440" bIns="45720" rtlCol="0" anchor="ctr">
-            <a:normAutofit/>
+            <a:normAutofit fontScale="77500" lnSpcReduction="20000"/>
           </a:bodyPr>
           <a:lstStyle>
             <a:lvl1pPr algn="l" defTabSz="914400" rtl="0" eaLnBrk="1" latinLnBrk="0" hangingPunct="1">
@@ -15845,7 +15574,7 @@
             <a:pPr algn="ctr"/>
             <a:r>
               <a:rPr lang="en-US" sz="3600" b="1" dirty="0"/>
-              <a:t>CPU Support</a:t>
+              <a:t>Example CPUs Claiming Support</a:t>
             </a:r>
           </a:p>
         </p:txBody>

</xml_diff>

<commit_message>
Remove confidential container term
PR #132 introduced the constraint that the "confidential <foo>"
has to be protected from its hosting environment.
As several people have pointed out, there's no known architecture
today that actually protects a container from its hosting environment.

Signed-off-by: Dave Thaler <dthaler@microsoft.com>
</commit_message>
<xml_diff>
--- a/terminology/Image-Source.pptx
+++ b/terminology/Image-Source.pptx
@@ -206,7 +206,7 @@
           <a:p>
             <a:fld id="{BEB2A2CE-FF9D-4999-808F-9409E590A58C}" type="datetimeFigureOut">
               <a:rPr lang="en-US" smtClean="0"/>
-              <a:t>8/26/2022</a:t>
+              <a:t>10/5/2022</a:t>
             </a:fld>
             <a:endParaRPr lang="en-US"/>
           </a:p>
@@ -620,7 +620,7 @@
           <a:p>
             <a:fld id="{7711E8AF-76FE-406B-93C1-ACC48771439D}" type="datetimeFigureOut">
               <a:rPr lang="en-US" smtClean="0"/>
-              <a:t>8/26/2022</a:t>
+              <a:t>10/5/2022</a:t>
             </a:fld>
             <a:endParaRPr lang="en-US"/>
           </a:p>
@@ -818,7 +818,7 @@
           <a:p>
             <a:fld id="{7711E8AF-76FE-406B-93C1-ACC48771439D}" type="datetimeFigureOut">
               <a:rPr lang="en-US" smtClean="0"/>
-              <a:t>8/26/2022</a:t>
+              <a:t>10/5/2022</a:t>
             </a:fld>
             <a:endParaRPr lang="en-US"/>
           </a:p>
@@ -1026,7 +1026,7 @@
           <a:p>
             <a:fld id="{7711E8AF-76FE-406B-93C1-ACC48771439D}" type="datetimeFigureOut">
               <a:rPr lang="en-US" smtClean="0"/>
-              <a:t>8/26/2022</a:t>
+              <a:t>10/5/2022</a:t>
             </a:fld>
             <a:endParaRPr lang="en-US"/>
           </a:p>
@@ -1224,7 +1224,7 @@
           <a:p>
             <a:fld id="{7711E8AF-76FE-406B-93C1-ACC48771439D}" type="datetimeFigureOut">
               <a:rPr lang="en-US" smtClean="0"/>
-              <a:t>8/26/2022</a:t>
+              <a:t>10/5/2022</a:t>
             </a:fld>
             <a:endParaRPr lang="en-US"/>
           </a:p>
@@ -1499,7 +1499,7 @@
           <a:p>
             <a:fld id="{7711E8AF-76FE-406B-93C1-ACC48771439D}" type="datetimeFigureOut">
               <a:rPr lang="en-US" smtClean="0"/>
-              <a:t>8/26/2022</a:t>
+              <a:t>10/5/2022</a:t>
             </a:fld>
             <a:endParaRPr lang="en-US"/>
           </a:p>
@@ -1764,7 +1764,7 @@
           <a:p>
             <a:fld id="{7711E8AF-76FE-406B-93C1-ACC48771439D}" type="datetimeFigureOut">
               <a:rPr lang="en-US" smtClean="0"/>
-              <a:t>8/26/2022</a:t>
+              <a:t>10/5/2022</a:t>
             </a:fld>
             <a:endParaRPr lang="en-US"/>
           </a:p>
@@ -2176,7 +2176,7 @@
           <a:p>
             <a:fld id="{7711E8AF-76FE-406B-93C1-ACC48771439D}" type="datetimeFigureOut">
               <a:rPr lang="en-US" smtClean="0"/>
-              <a:t>8/26/2022</a:t>
+              <a:t>10/5/2022</a:t>
             </a:fld>
             <a:endParaRPr lang="en-US"/>
           </a:p>
@@ -2317,7 +2317,7 @@
           <a:p>
             <a:fld id="{7711E8AF-76FE-406B-93C1-ACC48771439D}" type="datetimeFigureOut">
               <a:rPr lang="en-US" smtClean="0"/>
-              <a:t>8/26/2022</a:t>
+              <a:t>10/5/2022</a:t>
             </a:fld>
             <a:endParaRPr lang="en-US"/>
           </a:p>
@@ -2430,7 +2430,7 @@
           <a:p>
             <a:fld id="{7711E8AF-76FE-406B-93C1-ACC48771439D}" type="datetimeFigureOut">
               <a:rPr lang="en-US" smtClean="0"/>
-              <a:t>8/26/2022</a:t>
+              <a:t>10/5/2022</a:t>
             </a:fld>
             <a:endParaRPr lang="en-US"/>
           </a:p>
@@ -2741,7 +2741,7 @@
           <a:p>
             <a:fld id="{7711E8AF-76FE-406B-93C1-ACC48771439D}" type="datetimeFigureOut">
               <a:rPr lang="en-US" smtClean="0"/>
-              <a:t>8/26/2022</a:t>
+              <a:t>10/5/2022</a:t>
             </a:fld>
             <a:endParaRPr lang="en-US"/>
           </a:p>
@@ -3029,7 +3029,7 @@
           <a:p>
             <a:fld id="{7711E8AF-76FE-406B-93C1-ACC48771439D}" type="datetimeFigureOut">
               <a:rPr lang="en-US" smtClean="0"/>
-              <a:t>8/26/2022</a:t>
+              <a:t>10/5/2022</a:t>
             </a:fld>
             <a:endParaRPr lang="en-US"/>
           </a:p>
@@ -3270,7 +3270,7 @@
           <a:p>
             <a:fld id="{7711E8AF-76FE-406B-93C1-ACC48771439D}" type="datetimeFigureOut">
               <a:rPr lang="en-US" smtClean="0"/>
-              <a:t>8/26/2022</a:t>
+              <a:t>10/5/2022</a:t>
             </a:fld>
             <a:endParaRPr lang="en-US"/>
           </a:p>
@@ -5709,162 +5709,6 @@
       </p:sp>
       <p:sp>
         <p:nvSpPr>
-          <p:cNvPr id="49" name="TextBox 48">
-            <a:extLst>
-              <a:ext uri="{FF2B5EF4-FFF2-40B4-BE49-F238E27FC236}">
-                <a16:creationId xmlns:a16="http://schemas.microsoft.com/office/drawing/2014/main" id="{DD14FC25-FE13-A357-74CA-0D49E9B774FD}"/>
-              </a:ext>
-            </a:extLst>
-          </p:cNvPr>
-          <p:cNvSpPr txBox="1">
-            <a:spLocks/>
-          </p:cNvSpPr>
-          <p:nvPr/>
-        </p:nvSpPr>
-        <p:spPr>
-          <a:xfrm>
-            <a:off x="5005837" y="1406416"/>
-            <a:ext cx="1935436" cy="577081"/>
-          </a:xfrm>
-          <a:prstGeom prst="rect">
-            <a:avLst/>
-          </a:prstGeom>
-          <a:solidFill>
-            <a:schemeClr val="dk1">
-              <a:alpha val="50000"/>
-            </a:schemeClr>
-          </a:solidFill>
-          <a:ln>
-            <a:noFill/>
-          </a:ln>
-        </p:spPr>
-        <p:style>
-          <a:lnRef idx="0">
-            <a:scrgbClr r="0" g="0" b="0"/>
-          </a:lnRef>
-          <a:fillRef idx="0">
-            <a:scrgbClr r="0" g="0" b="0"/>
-          </a:fillRef>
-          <a:effectRef idx="0">
-            <a:scrgbClr r="0" g="0" b="0"/>
-          </a:effectRef>
-          <a:fontRef idx="minor">
-            <a:schemeClr val="lt1"/>
-          </a:fontRef>
-        </p:style>
-        <p:txBody>
-          <a:bodyPr wrap="square" rtlCol="0">
-            <a:spAutoFit/>
-          </a:bodyPr>
-          <a:lstStyle/>
-          <a:p>
-            <a:pPr algn="ctr"/>
-            <a:r>
-              <a:rPr lang="en-US" sz="1050" dirty="0">
-                <a:solidFill>
-                  <a:schemeClr val="tx1"/>
-                </a:solidFill>
-              </a:rPr>
-              <a:t>Library </a:t>
-            </a:r>
-          </a:p>
-          <a:p>
-            <a:pPr algn="ctr"/>
-            <a:r>
-              <a:rPr lang="en-US" sz="1050" dirty="0">
-                <a:solidFill>
-                  <a:schemeClr val="tx1"/>
-                </a:solidFill>
-              </a:rPr>
-              <a:t>Process</a:t>
-            </a:r>
-          </a:p>
-          <a:p>
-            <a:pPr algn="ctr"/>
-            <a:r>
-              <a:rPr lang="en-US" sz="1050" dirty="0">
-                <a:solidFill>
-                  <a:schemeClr val="tx1"/>
-                </a:solidFill>
-              </a:rPr>
-              <a:t>Container</a:t>
-            </a:r>
-          </a:p>
-        </p:txBody>
-      </p:sp>
-      <p:sp>
-        <p:nvSpPr>
-          <p:cNvPr id="51" name="TextBox 50">
-            <a:extLst>
-              <a:ext uri="{FF2B5EF4-FFF2-40B4-BE49-F238E27FC236}">
-                <a16:creationId xmlns:a16="http://schemas.microsoft.com/office/drawing/2014/main" id="{76C7E0D5-0B24-6B48-53C1-1342EF16551E}"/>
-              </a:ext>
-            </a:extLst>
-          </p:cNvPr>
-          <p:cNvSpPr txBox="1">
-            <a:spLocks/>
-          </p:cNvSpPr>
-          <p:nvPr/>
-        </p:nvSpPr>
-        <p:spPr>
-          <a:xfrm>
-            <a:off x="1762273" y="1408997"/>
-            <a:ext cx="869361" cy="415498"/>
-          </a:xfrm>
-          <a:prstGeom prst="rect">
-            <a:avLst/>
-          </a:prstGeom>
-          <a:solidFill>
-            <a:schemeClr val="dk1">
-              <a:alpha val="50000"/>
-            </a:schemeClr>
-          </a:solidFill>
-          <a:ln>
-            <a:noFill/>
-          </a:ln>
-        </p:spPr>
-        <p:style>
-          <a:lnRef idx="0">
-            <a:scrgbClr r="0" g="0" b="0"/>
-          </a:lnRef>
-          <a:fillRef idx="0">
-            <a:scrgbClr r="0" g="0" b="0"/>
-          </a:fillRef>
-          <a:effectRef idx="0">
-            <a:scrgbClr r="0" g="0" b="0"/>
-          </a:effectRef>
-          <a:fontRef idx="minor">
-            <a:schemeClr val="lt1"/>
-          </a:fontRef>
-        </p:style>
-        <p:txBody>
-          <a:bodyPr wrap="square" rtlCol="0">
-            <a:spAutoFit/>
-          </a:bodyPr>
-          <a:lstStyle/>
-          <a:p>
-            <a:pPr algn="ctr"/>
-            <a:r>
-              <a:rPr lang="en-US" sz="1050" dirty="0">
-                <a:solidFill>
-                  <a:schemeClr val="tx1"/>
-                </a:solidFill>
-              </a:rPr>
-              <a:t>Library</a:t>
-            </a:r>
-          </a:p>
-          <a:p>
-            <a:pPr algn="ctr"/>
-            <a:endParaRPr lang="en-US" sz="1050" dirty="0">
-              <a:solidFill>
-                <a:schemeClr val="tx1"/>
-              </a:solidFill>
-            </a:endParaRPr>
-          </a:p>
-        </p:txBody>
-      </p:sp>
-      <p:sp>
-        <p:nvSpPr>
           <p:cNvPr id="61" name="TextBox 60">
             <a:extLst>
               <a:ext uri="{FF2B5EF4-FFF2-40B4-BE49-F238E27FC236}">
@@ -5984,7 +5828,22 @@
                   <a:schemeClr val="tx1"/>
                 </a:solidFill>
               </a:rPr>
-              <a:t>Process on Separation Kernel</a:t>
+              <a:t>Process on Separate</a:t>
+            </a:r>
+            <a:br>
+              <a:rPr lang="en-US" sz="1050" dirty="0">
+                <a:solidFill>
+                  <a:schemeClr val="tx1"/>
+                </a:solidFill>
+              </a:rPr>
+            </a:br>
+            <a:r>
+              <a:rPr lang="en-US" sz="1050" dirty="0">
+                <a:solidFill>
+                  <a:schemeClr val="tx1"/>
+                </a:solidFill>
+              </a:rPr>
+              <a:t>Kernel</a:t>
             </a:r>
           </a:p>
         </p:txBody>
@@ -10898,7 +10757,7 @@
                     <a:schemeClr val="tx1"/>
                   </a:solidFill>
                 </a:rPr>
-                <a:t>Process on Separation Kernel</a:t>
+                <a:t>Process on Separate Kernel</a:t>
               </a:r>
             </a:p>
           </p:txBody>
@@ -12351,6 +12210,132 @@
           <a:p>
             <a:pPr algn="ctr"/>
             <a:endParaRPr lang="en-US"/>
+          </a:p>
+        </p:txBody>
+      </p:sp>
+      <p:sp>
+        <p:nvSpPr>
+          <p:cNvPr id="6" name="TextBox 5">
+            <a:extLst>
+              <a:ext uri="{FF2B5EF4-FFF2-40B4-BE49-F238E27FC236}">
+                <a16:creationId xmlns:a16="http://schemas.microsoft.com/office/drawing/2014/main" id="{4442CBD7-4CFF-FA5E-BB75-B0E1229FB523}"/>
+              </a:ext>
+            </a:extLst>
+          </p:cNvPr>
+          <p:cNvSpPr txBox="1">
+            <a:spLocks/>
+          </p:cNvSpPr>
+          <p:nvPr/>
+        </p:nvSpPr>
+        <p:spPr>
+          <a:xfrm>
+            <a:off x="5019833" y="1408997"/>
+            <a:ext cx="1921440" cy="253916"/>
+          </a:xfrm>
+          <a:prstGeom prst="rect">
+            <a:avLst/>
+          </a:prstGeom>
+          <a:solidFill>
+            <a:schemeClr val="dk1">
+              <a:alpha val="50000"/>
+            </a:schemeClr>
+          </a:solidFill>
+          <a:ln>
+            <a:noFill/>
+          </a:ln>
+        </p:spPr>
+        <p:style>
+          <a:lnRef idx="0">
+            <a:scrgbClr r="0" g="0" b="0"/>
+          </a:lnRef>
+          <a:fillRef idx="0">
+            <a:scrgbClr r="0" g="0" b="0"/>
+          </a:fillRef>
+          <a:effectRef idx="0">
+            <a:scrgbClr r="0" g="0" b="0"/>
+          </a:effectRef>
+          <a:fontRef idx="minor">
+            <a:schemeClr val="lt1"/>
+          </a:fontRef>
+        </p:style>
+        <p:txBody>
+          <a:bodyPr wrap="square" rtlCol="0">
+            <a:spAutoFit/>
+          </a:bodyPr>
+          <a:lstStyle/>
+          <a:p>
+            <a:pPr algn="ctr"/>
+            <a:r>
+              <a:rPr lang="en-US" sz="1050" dirty="0">
+                <a:solidFill>
+                  <a:schemeClr val="tx1"/>
+                </a:solidFill>
+              </a:rPr>
+              <a:t> Library</a:t>
+            </a:r>
+          </a:p>
+        </p:txBody>
+      </p:sp>
+      <p:sp>
+        <p:nvSpPr>
+          <p:cNvPr id="8" name="TextBox 7">
+            <a:extLst>
+              <a:ext uri="{FF2B5EF4-FFF2-40B4-BE49-F238E27FC236}">
+                <a16:creationId xmlns:a16="http://schemas.microsoft.com/office/drawing/2014/main" id="{0717507A-B766-D554-BA87-662CBDC2ABF9}"/>
+              </a:ext>
+            </a:extLst>
+          </p:cNvPr>
+          <p:cNvSpPr txBox="1">
+            <a:spLocks/>
+          </p:cNvSpPr>
+          <p:nvPr/>
+        </p:nvSpPr>
+        <p:spPr>
+          <a:xfrm>
+            <a:off x="1749338" y="1401045"/>
+            <a:ext cx="879034" cy="253916"/>
+          </a:xfrm>
+          <a:prstGeom prst="rect">
+            <a:avLst/>
+          </a:prstGeom>
+          <a:solidFill>
+            <a:schemeClr val="dk1">
+              <a:alpha val="50000"/>
+            </a:schemeClr>
+          </a:solidFill>
+          <a:ln>
+            <a:noFill/>
+          </a:ln>
+        </p:spPr>
+        <p:style>
+          <a:lnRef idx="0">
+            <a:scrgbClr r="0" g="0" b="0"/>
+          </a:lnRef>
+          <a:fillRef idx="0">
+            <a:scrgbClr r="0" g="0" b="0"/>
+          </a:fillRef>
+          <a:effectRef idx="0">
+            <a:scrgbClr r="0" g="0" b="0"/>
+          </a:effectRef>
+          <a:fontRef idx="minor">
+            <a:schemeClr val="lt1"/>
+          </a:fontRef>
+        </p:style>
+        <p:txBody>
+          <a:bodyPr wrap="square" rtlCol="0">
+            <a:spAutoFit/>
+          </a:bodyPr>
+          <a:lstStyle/>
+          <a:p>
+            <a:pPr algn="ctr"/>
+            <a:r>
+              <a:rPr lang="en-US" sz="1050" dirty="0">
+                <a:solidFill>
+                  <a:schemeClr val="tx1"/>
+                </a:solidFill>
+              </a:rPr>
+              <a:t> Library</a:t>
+            </a:r>
           </a:p>
         </p:txBody>
       </p:sp>

</xml_diff>